<commit_message>
udpate materi spring data jpa
</commit_message>
<xml_diff>
--- a/#08 - Hibernate ORM.pptx
+++ b/#08 - Hibernate ORM.pptx
@@ -19,6 +19,7 @@
     <p:sldId id="299" r:id="rId14"/>
     <p:sldId id="300" r:id="rId15"/>
     <p:sldId id="301" r:id="rId16"/>
+    <p:sldId id="306" r:id="rId17"/>
   </p:sldIdLst>
   <p:sldSz cx="12192000" cy="6858000"/>
   <p:notesSz cx="6858000" cy="9144000"/>
@@ -5974,12 +5975,12 @@
       </p:sp>
       <p:sp>
         <p:nvSpPr>
-          <p:cNvPr id="3" name="Text Placeholder 2"/>
-          <p:cNvSpPr>
-            <a:spLocks noGrp="1"/>
-          </p:cNvSpPr>
-          <p:nvPr>
-            <p:ph type="body" idx="1"/>
+          <p:cNvPr id="7" name="Content Placeholder 6"/>
+          <p:cNvSpPr>
+            <a:spLocks noGrp="1"/>
+          </p:cNvSpPr>
+          <p:nvPr>
+            <p:ph sz="half" idx="1"/>
           </p:nvPr>
         </p:nvSpPr>
         <p:spPr/>
@@ -5992,48 +5993,12 @@
       </p:sp>
       <p:sp>
         <p:nvSpPr>
-          <p:cNvPr id="4" name="Content Placeholder 3"/>
+          <p:cNvPr id="8" name="Content Placeholder 7"/>
           <p:cNvSpPr>
             <a:spLocks noGrp="1"/>
           </p:cNvSpPr>
           <p:nvPr>
             <p:ph sz="half" idx="2"/>
-          </p:nvPr>
-        </p:nvSpPr>
-        <p:spPr/>
-        <p:txBody>
-          <a:bodyPr/>
-          <a:p>
-            <a:endParaRPr lang="en-GB" altLang="en-US"/>
-          </a:p>
-        </p:txBody>
-      </p:sp>
-      <p:sp>
-        <p:nvSpPr>
-          <p:cNvPr id="5" name="Text Placeholder 4"/>
-          <p:cNvSpPr>
-            <a:spLocks noGrp="1"/>
-          </p:cNvSpPr>
-          <p:nvPr>
-            <p:ph type="body" sz="quarter" idx="3"/>
-          </p:nvPr>
-        </p:nvSpPr>
-        <p:spPr/>
-        <p:txBody>
-          <a:bodyPr/>
-          <a:p>
-            <a:endParaRPr lang="en-GB" altLang="en-US"/>
-          </a:p>
-        </p:txBody>
-      </p:sp>
-      <p:sp>
-        <p:nvSpPr>
-          <p:cNvPr id="6" name="Content Placeholder 5"/>
-          <p:cNvSpPr>
-            <a:spLocks noGrp="1"/>
-          </p:cNvSpPr>
-          <p:nvPr>
-            <p:ph sz="quarter" idx="4"/>
           </p:nvPr>
         </p:nvSpPr>
         <p:spPr/>
@@ -6086,12 +6051,12 @@
       </p:sp>
       <p:sp>
         <p:nvSpPr>
-          <p:cNvPr id="3" name="Text Placeholder 2"/>
-          <p:cNvSpPr>
-            <a:spLocks noGrp="1"/>
-          </p:cNvSpPr>
-          <p:nvPr>
-            <p:ph type="body" idx="1"/>
+          <p:cNvPr id="7" name="Content Placeholder 6"/>
+          <p:cNvSpPr>
+            <a:spLocks noGrp="1"/>
+          </p:cNvSpPr>
+          <p:nvPr>
+            <p:ph sz="half" idx="1"/>
           </p:nvPr>
         </p:nvSpPr>
         <p:spPr/>
@@ -6104,48 +6069,12 @@
       </p:sp>
       <p:sp>
         <p:nvSpPr>
-          <p:cNvPr id="4" name="Content Placeholder 3"/>
+          <p:cNvPr id="8" name="Content Placeholder 7"/>
           <p:cNvSpPr>
             <a:spLocks noGrp="1"/>
           </p:cNvSpPr>
           <p:nvPr>
             <p:ph sz="half" idx="2"/>
-          </p:nvPr>
-        </p:nvSpPr>
-        <p:spPr/>
-        <p:txBody>
-          <a:bodyPr/>
-          <a:p>
-            <a:endParaRPr lang="en-GB" altLang="en-US"/>
-          </a:p>
-        </p:txBody>
-      </p:sp>
-      <p:sp>
-        <p:nvSpPr>
-          <p:cNvPr id="5" name="Text Placeholder 4"/>
-          <p:cNvSpPr>
-            <a:spLocks noGrp="1"/>
-          </p:cNvSpPr>
-          <p:nvPr>
-            <p:ph type="body" sz="quarter" idx="3"/>
-          </p:nvPr>
-        </p:nvSpPr>
-        <p:spPr/>
-        <p:txBody>
-          <a:bodyPr/>
-          <a:p>
-            <a:endParaRPr lang="en-GB" altLang="en-US"/>
-          </a:p>
-        </p:txBody>
-      </p:sp>
-      <p:sp>
-        <p:nvSpPr>
-          <p:cNvPr id="6" name="Content Placeholder 5"/>
-          <p:cNvSpPr>
-            <a:spLocks noGrp="1"/>
-          </p:cNvSpPr>
-          <p:nvPr>
-            <p:ph sz="quarter" idx="4"/>
           </p:nvPr>
         </p:nvSpPr>
         <p:spPr/>
@@ -6198,12 +6127,12 @@
       </p:sp>
       <p:sp>
         <p:nvSpPr>
-          <p:cNvPr id="3" name="Text Placeholder 2"/>
-          <p:cNvSpPr>
-            <a:spLocks noGrp="1"/>
-          </p:cNvSpPr>
-          <p:nvPr>
-            <p:ph type="body" idx="1"/>
+          <p:cNvPr id="7" name="Content Placeholder 6"/>
+          <p:cNvSpPr>
+            <a:spLocks noGrp="1"/>
+          </p:cNvSpPr>
+          <p:nvPr>
+            <p:ph sz="half" idx="1"/>
           </p:nvPr>
         </p:nvSpPr>
         <p:spPr/>
@@ -6216,48 +6145,12 @@
       </p:sp>
       <p:sp>
         <p:nvSpPr>
-          <p:cNvPr id="4" name="Content Placeholder 3"/>
+          <p:cNvPr id="8" name="Content Placeholder 7"/>
           <p:cNvSpPr>
             <a:spLocks noGrp="1"/>
           </p:cNvSpPr>
           <p:nvPr>
             <p:ph sz="half" idx="2"/>
-          </p:nvPr>
-        </p:nvSpPr>
-        <p:spPr/>
-        <p:txBody>
-          <a:bodyPr/>
-          <a:p>
-            <a:endParaRPr lang="en-GB" altLang="en-US"/>
-          </a:p>
-        </p:txBody>
-      </p:sp>
-      <p:sp>
-        <p:nvSpPr>
-          <p:cNvPr id="5" name="Text Placeholder 4"/>
-          <p:cNvSpPr>
-            <a:spLocks noGrp="1"/>
-          </p:cNvSpPr>
-          <p:nvPr>
-            <p:ph type="body" sz="quarter" idx="3"/>
-          </p:nvPr>
-        </p:nvSpPr>
-        <p:spPr/>
-        <p:txBody>
-          <a:bodyPr/>
-          <a:p>
-            <a:endParaRPr lang="en-GB" altLang="en-US"/>
-          </a:p>
-        </p:txBody>
-      </p:sp>
-      <p:sp>
-        <p:nvSpPr>
-          <p:cNvPr id="6" name="Content Placeholder 5"/>
-          <p:cNvSpPr>
-            <a:spLocks noGrp="1"/>
-          </p:cNvSpPr>
-          <p:nvPr>
-            <p:ph sz="quarter" idx="4"/>
           </p:nvPr>
         </p:nvSpPr>
         <p:spPr/>
@@ -6310,12 +6203,12 @@
       </p:sp>
       <p:sp>
         <p:nvSpPr>
-          <p:cNvPr id="3" name="Text Placeholder 2"/>
-          <p:cNvSpPr>
-            <a:spLocks noGrp="1"/>
-          </p:cNvSpPr>
-          <p:nvPr>
-            <p:ph type="body" idx="1"/>
+          <p:cNvPr id="7" name="Content Placeholder 6"/>
+          <p:cNvSpPr>
+            <a:spLocks noGrp="1"/>
+          </p:cNvSpPr>
+          <p:nvPr>
+            <p:ph sz="half" idx="1"/>
           </p:nvPr>
         </p:nvSpPr>
         <p:spPr/>
@@ -6328,48 +6221,12 @@
       </p:sp>
       <p:sp>
         <p:nvSpPr>
-          <p:cNvPr id="4" name="Content Placeholder 3"/>
+          <p:cNvPr id="8" name="Content Placeholder 7"/>
           <p:cNvSpPr>
             <a:spLocks noGrp="1"/>
           </p:cNvSpPr>
           <p:nvPr>
             <p:ph sz="half" idx="2"/>
-          </p:nvPr>
-        </p:nvSpPr>
-        <p:spPr/>
-        <p:txBody>
-          <a:bodyPr/>
-          <a:p>
-            <a:endParaRPr lang="en-GB" altLang="en-US"/>
-          </a:p>
-        </p:txBody>
-      </p:sp>
-      <p:sp>
-        <p:nvSpPr>
-          <p:cNvPr id="5" name="Text Placeholder 4"/>
-          <p:cNvSpPr>
-            <a:spLocks noGrp="1"/>
-          </p:cNvSpPr>
-          <p:nvPr>
-            <p:ph type="body" sz="quarter" idx="3"/>
-          </p:nvPr>
-        </p:nvSpPr>
-        <p:spPr/>
-        <p:txBody>
-          <a:bodyPr/>
-          <a:p>
-            <a:endParaRPr lang="en-GB" altLang="en-US"/>
-          </a:p>
-        </p:txBody>
-      </p:sp>
-      <p:sp>
-        <p:nvSpPr>
-          <p:cNvPr id="6" name="Content Placeholder 5"/>
-          <p:cNvSpPr>
-            <a:spLocks noGrp="1"/>
-          </p:cNvSpPr>
-          <p:nvPr>
-            <p:ph sz="quarter" idx="4"/>
           </p:nvPr>
         </p:nvSpPr>
         <p:spPr/>
@@ -6417,6 +6274,118 @@
               <a:t>Criteria API</a:t>
             </a:r>
             <a:endParaRPr lang="en-US" altLang="en-GB"/>
+          </a:p>
+        </p:txBody>
+      </p:sp>
+      <p:sp>
+        <p:nvSpPr>
+          <p:cNvPr id="3" name="Content Placeholder 2"/>
+          <p:cNvSpPr>
+            <a:spLocks noGrp="1"/>
+          </p:cNvSpPr>
+          <p:nvPr>
+            <p:ph sz="half" idx="1"/>
+          </p:nvPr>
+        </p:nvSpPr>
+        <p:spPr/>
+        <p:txBody>
+          <a:bodyPr/>
+          <a:p>
+            <a:endParaRPr lang="en-GB" altLang="en-US"/>
+          </a:p>
+        </p:txBody>
+      </p:sp>
+      <p:sp>
+        <p:nvSpPr>
+          <p:cNvPr id="4" name="Content Placeholder 3"/>
+          <p:cNvSpPr>
+            <a:spLocks noGrp="1"/>
+          </p:cNvSpPr>
+          <p:nvPr>
+            <p:ph sz="half" idx="2"/>
+          </p:nvPr>
+        </p:nvSpPr>
+        <p:spPr/>
+        <p:txBody>
+          <a:bodyPr/>
+          <a:p>
+            <a:endParaRPr lang="en-GB" altLang="en-US"/>
+          </a:p>
+        </p:txBody>
+      </p:sp>
+    </p:spTree>
+  </p:cSld>
+  <p:clrMapOvr>
+    <a:masterClrMapping/>
+  </p:clrMapOvr>
+</p:sld>
+</file>
+
+<file path=ppt/slides/slide15.xml><?xml version="1.0" encoding="utf-8"?>
+<p:sld xmlns:a="http://schemas.openxmlformats.org/drawingml/2006/main" xmlns:r="http://schemas.openxmlformats.org/officeDocument/2006/relationships" xmlns:p="http://schemas.openxmlformats.org/presentationml/2006/main">
+  <p:cSld>
+    <p:spTree>
+      <p:nvGrpSpPr>
+        <p:cNvPr id="1" name=""/>
+        <p:cNvGrpSpPr/>
+        <p:nvPr/>
+      </p:nvGrpSpPr>
+      <p:grpSpPr/>
+      <p:sp>
+        <p:nvSpPr>
+          <p:cNvPr id="2" name="Title 1"/>
+          <p:cNvSpPr>
+            <a:spLocks noGrp="1"/>
+          </p:cNvSpPr>
+          <p:nvPr>
+            <p:ph type="title"/>
+          </p:nvPr>
+        </p:nvSpPr>
+        <p:spPr/>
+        <p:txBody>
+          <a:bodyPr/>
+          <a:p>
+            <a:r>
+              <a:rPr lang="en-US" altLang="en-GB"/>
+              <a:t>Inheritance in Hibernate</a:t>
+            </a:r>
+            <a:endParaRPr lang="en-US" altLang="en-GB"/>
+          </a:p>
+        </p:txBody>
+      </p:sp>
+      <p:sp>
+        <p:nvSpPr>
+          <p:cNvPr id="8" name="Content Placeholder 7"/>
+          <p:cNvSpPr>
+            <a:spLocks noGrp="1"/>
+          </p:cNvSpPr>
+          <p:nvPr>
+            <p:ph sz="half" idx="1"/>
+          </p:nvPr>
+        </p:nvSpPr>
+        <p:spPr/>
+        <p:txBody>
+          <a:bodyPr/>
+          <a:p>
+            <a:endParaRPr lang="en-GB" altLang="en-US"/>
+          </a:p>
+        </p:txBody>
+      </p:sp>
+      <p:sp>
+        <p:nvSpPr>
+          <p:cNvPr id="9" name="Content Placeholder 8"/>
+          <p:cNvSpPr>
+            <a:spLocks noGrp="1"/>
+          </p:cNvSpPr>
+          <p:nvPr>
+            <p:ph sz="half" idx="2"/>
+          </p:nvPr>
+        </p:nvSpPr>
+        <p:spPr/>
+        <p:txBody>
+          <a:bodyPr/>
+          <a:p>
+            <a:endParaRPr lang="en-GB" altLang="en-US"/>
           </a:p>
         </p:txBody>
       </p:sp>
@@ -6820,12 +6789,12 @@
       </p:sp>
       <p:sp>
         <p:nvSpPr>
-          <p:cNvPr id="3" name="Text Placeholder 2"/>
-          <p:cNvSpPr>
-            <a:spLocks noGrp="1"/>
-          </p:cNvSpPr>
-          <p:nvPr>
-            <p:ph type="body" idx="1"/>
+          <p:cNvPr id="7" name="Content Placeholder 6"/>
+          <p:cNvSpPr>
+            <a:spLocks noGrp="1"/>
+          </p:cNvSpPr>
+          <p:nvPr>
+            <p:ph sz="half" idx="1"/>
           </p:nvPr>
         </p:nvSpPr>
         <p:spPr/>
@@ -6838,48 +6807,12 @@
       </p:sp>
       <p:sp>
         <p:nvSpPr>
-          <p:cNvPr id="4" name="Content Placeholder 3"/>
+          <p:cNvPr id="8" name="Content Placeholder 7"/>
           <p:cNvSpPr>
             <a:spLocks noGrp="1"/>
           </p:cNvSpPr>
           <p:nvPr>
             <p:ph sz="half" idx="2"/>
-          </p:nvPr>
-        </p:nvSpPr>
-        <p:spPr/>
-        <p:txBody>
-          <a:bodyPr/>
-          <a:p>
-            <a:endParaRPr lang="en-GB" altLang="en-US"/>
-          </a:p>
-        </p:txBody>
-      </p:sp>
-      <p:sp>
-        <p:nvSpPr>
-          <p:cNvPr id="5" name="Text Placeholder 4"/>
-          <p:cNvSpPr>
-            <a:spLocks noGrp="1"/>
-          </p:cNvSpPr>
-          <p:nvPr>
-            <p:ph type="body" sz="quarter" idx="3"/>
-          </p:nvPr>
-        </p:nvSpPr>
-        <p:spPr/>
-        <p:txBody>
-          <a:bodyPr/>
-          <a:p>
-            <a:endParaRPr lang="en-GB" altLang="en-US"/>
-          </a:p>
-        </p:txBody>
-      </p:sp>
-      <p:sp>
-        <p:nvSpPr>
-          <p:cNvPr id="6" name="Content Placeholder 5"/>
-          <p:cNvSpPr>
-            <a:spLocks noGrp="1"/>
-          </p:cNvSpPr>
-          <p:nvPr>
-            <p:ph sz="quarter" idx="4"/>
           </p:nvPr>
         </p:nvSpPr>
         <p:spPr/>
@@ -6932,12 +6865,12 @@
       </p:sp>
       <p:sp>
         <p:nvSpPr>
-          <p:cNvPr id="3" name="Text Placeholder 2"/>
-          <p:cNvSpPr>
-            <a:spLocks noGrp="1"/>
-          </p:cNvSpPr>
-          <p:nvPr>
-            <p:ph type="body" idx="1"/>
+          <p:cNvPr id="7" name="Content Placeholder 6"/>
+          <p:cNvSpPr>
+            <a:spLocks noGrp="1"/>
+          </p:cNvSpPr>
+          <p:nvPr>
+            <p:ph sz="half" idx="1"/>
           </p:nvPr>
         </p:nvSpPr>
         <p:spPr/>
@@ -6950,48 +6883,12 @@
       </p:sp>
       <p:sp>
         <p:nvSpPr>
-          <p:cNvPr id="4" name="Content Placeholder 3"/>
+          <p:cNvPr id="8" name="Content Placeholder 7"/>
           <p:cNvSpPr>
             <a:spLocks noGrp="1"/>
           </p:cNvSpPr>
           <p:nvPr>
             <p:ph sz="half" idx="2"/>
-          </p:nvPr>
-        </p:nvSpPr>
-        <p:spPr/>
-        <p:txBody>
-          <a:bodyPr/>
-          <a:p>
-            <a:endParaRPr lang="en-GB" altLang="en-US"/>
-          </a:p>
-        </p:txBody>
-      </p:sp>
-      <p:sp>
-        <p:nvSpPr>
-          <p:cNvPr id="5" name="Text Placeholder 4"/>
-          <p:cNvSpPr>
-            <a:spLocks noGrp="1"/>
-          </p:cNvSpPr>
-          <p:nvPr>
-            <p:ph type="body" sz="quarter" idx="3"/>
-          </p:nvPr>
-        </p:nvSpPr>
-        <p:spPr/>
-        <p:txBody>
-          <a:bodyPr/>
-          <a:p>
-            <a:endParaRPr lang="en-GB" altLang="en-US"/>
-          </a:p>
-        </p:txBody>
-      </p:sp>
-      <p:sp>
-        <p:nvSpPr>
-          <p:cNvPr id="6" name="Content Placeholder 5"/>
-          <p:cNvSpPr>
-            <a:spLocks noGrp="1"/>
-          </p:cNvSpPr>
-          <p:nvPr>
-            <p:ph sz="quarter" idx="4"/>
           </p:nvPr>
         </p:nvSpPr>
         <p:spPr/>
@@ -7044,12 +6941,12 @@
       </p:sp>
       <p:sp>
         <p:nvSpPr>
-          <p:cNvPr id="3" name="Text Placeholder 2"/>
-          <p:cNvSpPr>
-            <a:spLocks noGrp="1"/>
-          </p:cNvSpPr>
-          <p:nvPr>
-            <p:ph type="body" idx="1"/>
+          <p:cNvPr id="7" name="Content Placeholder 6"/>
+          <p:cNvSpPr>
+            <a:spLocks noGrp="1"/>
+          </p:cNvSpPr>
+          <p:nvPr>
+            <p:ph sz="half" idx="1"/>
           </p:nvPr>
         </p:nvSpPr>
         <p:spPr/>
@@ -7062,48 +6959,12 @@
       </p:sp>
       <p:sp>
         <p:nvSpPr>
-          <p:cNvPr id="4" name="Content Placeholder 3"/>
+          <p:cNvPr id="8" name="Content Placeholder 7"/>
           <p:cNvSpPr>
             <a:spLocks noGrp="1"/>
           </p:cNvSpPr>
           <p:nvPr>
             <p:ph sz="half" idx="2"/>
-          </p:nvPr>
-        </p:nvSpPr>
-        <p:spPr/>
-        <p:txBody>
-          <a:bodyPr/>
-          <a:p>
-            <a:endParaRPr lang="en-GB" altLang="en-US"/>
-          </a:p>
-        </p:txBody>
-      </p:sp>
-      <p:sp>
-        <p:nvSpPr>
-          <p:cNvPr id="5" name="Text Placeholder 4"/>
-          <p:cNvSpPr>
-            <a:spLocks noGrp="1"/>
-          </p:cNvSpPr>
-          <p:nvPr>
-            <p:ph type="body" sz="quarter" idx="3"/>
-          </p:nvPr>
-        </p:nvSpPr>
-        <p:spPr/>
-        <p:txBody>
-          <a:bodyPr/>
-          <a:p>
-            <a:endParaRPr lang="en-GB" altLang="en-US"/>
-          </a:p>
-        </p:txBody>
-      </p:sp>
-      <p:sp>
-        <p:nvSpPr>
-          <p:cNvPr id="6" name="Content Placeholder 5"/>
-          <p:cNvSpPr>
-            <a:spLocks noGrp="1"/>
-          </p:cNvSpPr>
-          <p:nvPr>
-            <p:ph sz="quarter" idx="4"/>
           </p:nvPr>
         </p:nvSpPr>
         <p:spPr/>
@@ -7156,12 +7017,12 @@
       </p:sp>
       <p:sp>
         <p:nvSpPr>
-          <p:cNvPr id="3" name="Text Placeholder 2"/>
-          <p:cNvSpPr>
-            <a:spLocks noGrp="1"/>
-          </p:cNvSpPr>
-          <p:nvPr>
-            <p:ph type="body" idx="1"/>
+          <p:cNvPr id="7" name="Content Placeholder 6"/>
+          <p:cNvSpPr>
+            <a:spLocks noGrp="1"/>
+          </p:cNvSpPr>
+          <p:nvPr>
+            <p:ph sz="half" idx="1"/>
           </p:nvPr>
         </p:nvSpPr>
         <p:spPr/>
@@ -7174,48 +7035,12 @@
       </p:sp>
       <p:sp>
         <p:nvSpPr>
-          <p:cNvPr id="4" name="Content Placeholder 3"/>
+          <p:cNvPr id="8" name="Content Placeholder 7"/>
           <p:cNvSpPr>
             <a:spLocks noGrp="1"/>
           </p:cNvSpPr>
           <p:nvPr>
             <p:ph sz="half" idx="2"/>
-          </p:nvPr>
-        </p:nvSpPr>
-        <p:spPr/>
-        <p:txBody>
-          <a:bodyPr/>
-          <a:p>
-            <a:endParaRPr lang="en-GB" altLang="en-US"/>
-          </a:p>
-        </p:txBody>
-      </p:sp>
-      <p:sp>
-        <p:nvSpPr>
-          <p:cNvPr id="5" name="Text Placeholder 4"/>
-          <p:cNvSpPr>
-            <a:spLocks noGrp="1"/>
-          </p:cNvSpPr>
-          <p:nvPr>
-            <p:ph type="body" sz="quarter" idx="3"/>
-          </p:nvPr>
-        </p:nvSpPr>
-        <p:spPr/>
-        <p:txBody>
-          <a:bodyPr/>
-          <a:p>
-            <a:endParaRPr lang="en-GB" altLang="en-US"/>
-          </a:p>
-        </p:txBody>
-      </p:sp>
-      <p:sp>
-        <p:nvSpPr>
-          <p:cNvPr id="6" name="Content Placeholder 5"/>
-          <p:cNvSpPr>
-            <a:spLocks noGrp="1"/>
-          </p:cNvSpPr>
-          <p:nvPr>
-            <p:ph sz="quarter" idx="4"/>
           </p:nvPr>
         </p:nvSpPr>
         <p:spPr/>
@@ -7268,12 +7093,12 @@
       </p:sp>
       <p:sp>
         <p:nvSpPr>
-          <p:cNvPr id="3" name="Text Placeholder 2"/>
-          <p:cNvSpPr>
-            <a:spLocks noGrp="1"/>
-          </p:cNvSpPr>
-          <p:nvPr>
-            <p:ph type="body" idx="1"/>
+          <p:cNvPr id="7" name="Content Placeholder 6"/>
+          <p:cNvSpPr>
+            <a:spLocks noGrp="1"/>
+          </p:cNvSpPr>
+          <p:nvPr>
+            <p:ph sz="half" idx="1"/>
           </p:nvPr>
         </p:nvSpPr>
         <p:spPr/>
@@ -7286,48 +7111,12 @@
       </p:sp>
       <p:sp>
         <p:nvSpPr>
-          <p:cNvPr id="4" name="Content Placeholder 3"/>
+          <p:cNvPr id="8" name="Content Placeholder 7"/>
           <p:cNvSpPr>
             <a:spLocks noGrp="1"/>
           </p:cNvSpPr>
           <p:nvPr>
             <p:ph sz="half" idx="2"/>
-          </p:nvPr>
-        </p:nvSpPr>
-        <p:spPr/>
-        <p:txBody>
-          <a:bodyPr/>
-          <a:p>
-            <a:endParaRPr lang="en-GB" altLang="en-US"/>
-          </a:p>
-        </p:txBody>
-      </p:sp>
-      <p:sp>
-        <p:nvSpPr>
-          <p:cNvPr id="5" name="Text Placeholder 4"/>
-          <p:cNvSpPr>
-            <a:spLocks noGrp="1"/>
-          </p:cNvSpPr>
-          <p:nvPr>
-            <p:ph type="body" sz="quarter" idx="3"/>
-          </p:nvPr>
-        </p:nvSpPr>
-        <p:spPr/>
-        <p:txBody>
-          <a:bodyPr/>
-          <a:p>
-            <a:endParaRPr lang="en-GB" altLang="en-US"/>
-          </a:p>
-        </p:txBody>
-      </p:sp>
-      <p:sp>
-        <p:nvSpPr>
-          <p:cNvPr id="6" name="Content Placeholder 5"/>
-          <p:cNvSpPr>
-            <a:spLocks noGrp="1"/>
-          </p:cNvSpPr>
-          <p:nvPr>
-            <p:ph sz="quarter" idx="4"/>
           </p:nvPr>
         </p:nvSpPr>
         <p:spPr/>

</xml_diff>